<commit_message>
ISIS-2181: rationalizing core/pom.xml vs spring boot parent
</commit_message>
<xml_diff>
--- a/antora/components/core/modules/archdesign/attachments/pom-hierarchy.pptx
+++ b/antora/components/core/modules/archdesign/attachments/pom-hierarchy.pptx
@@ -3767,15 +3767,15 @@
         </p:spPr>
         <p:style>
           <a:lnRef idx="2">
-            <a:schemeClr val="accent1">
+            <a:schemeClr val="accent6">
               <a:shade val="50000"/>
             </a:schemeClr>
           </a:lnRef>
           <a:fillRef idx="1">
-            <a:schemeClr val="accent1"/>
+            <a:schemeClr val="accent6"/>
           </a:fillRef>
           <a:effectRef idx="0">
-            <a:schemeClr val="accent1"/>
+            <a:schemeClr val="accent6"/>
           </a:effectRef>
           <a:fontRef idx="minor">
             <a:schemeClr val="lt1"/>
@@ -6122,6 +6122,56 @@
             <a:r>
               <a:rPr lang="en-GB" sz="1400" i="1" dirty="0"/>
               <a:t>only</a:t>
+            </a:r>
+          </a:p>
+        </p:txBody>
+      </p:sp>
+      <p:sp>
+        <p:nvSpPr>
+          <p:cNvPr id="57" name="TextBox 56">
+            <a:extLst>
+              <a:ext uri="{FF2B5EF4-FFF2-40B4-BE49-F238E27FC236}">
+                <a16:creationId xmlns:a16="http://schemas.microsoft.com/office/drawing/2014/main" id="{D673CB78-C50E-4305-B88F-2464BC433CDD}"/>
+              </a:ext>
+            </a:extLst>
+          </p:cNvPr>
+          <p:cNvSpPr txBox="1"/>
+          <p:nvPr/>
+        </p:nvSpPr>
+        <p:spPr>
+          <a:xfrm>
+            <a:off x="4945630" y="3010629"/>
+            <a:ext cx="2583807" cy="707886"/>
+          </a:xfrm>
+          <a:prstGeom prst="rect">
+            <a:avLst/>
+          </a:prstGeom>
+          <a:noFill/>
+        </p:spPr>
+        <p:txBody>
+          <a:bodyPr wrap="square" rtlCol="0">
+            <a:spAutoFit/>
+          </a:bodyPr>
+          <a:lstStyle/>
+          <a:p>
+            <a:pPr algn="ctr"/>
+            <a:r>
+              <a:rPr lang="en-GB" sz="1600" dirty="0"/>
+              <a:t>Convenience pom</a:t>
+            </a:r>
+            <a:br>
+              <a:rPr lang="en-GB" sz="1600" dirty="0"/>
+            </a:br>
+            <a:r>
+              <a:rPr lang="en-GB" sz="1200" i="1" dirty="0"/>
+              <a:t>scope=import,</a:t>
+            </a:r>
+            <a:br>
+              <a:rPr lang="en-GB" sz="1200" i="1" dirty="0"/>
+            </a:br>
+            <a:r>
+              <a:rPr lang="en-GB" sz="1200" i="1" dirty="0"/>
+              <a:t>type=pom</a:t>
             </a:r>
           </a:p>
         </p:txBody>

</xml_diff>

<commit_message>
ISIS-2181: upgrades cucumber (specsupport)
also updates mml integtests for simpleapp
</commit_message>
<xml_diff>
--- a/antora/components/core/modules/archdesign/attachments/pom-hierarchy.pptx
+++ b/antora/components/core/modules/archdesign/attachments/pom-hierarchy.pptx
@@ -3361,7 +3361,7 @@
         </p:nvSpPr>
         <p:spPr>
           <a:xfrm>
-            <a:off x="9244389" y="3365043"/>
+            <a:off x="8744064" y="3279262"/>
             <a:ext cx="2682817" cy="609606"/>
           </a:xfrm>
           <a:prstGeom prst="rect">
@@ -3815,7 +3815,7 @@
         </p:nvSpPr>
         <p:spPr>
           <a:xfrm>
-            <a:off x="7907286" y="4145164"/>
+            <a:off x="8415362" y="4145164"/>
             <a:ext cx="2682817" cy="609606"/>
           </a:xfrm>
           <a:prstGeom prst="rect">
@@ -3873,66 +3873,6 @@
         <p:spPr>
           <a:xfrm>
             <a:off x="3349881" y="4150381"/>
-            <a:ext cx="2682817" cy="609606"/>
-          </a:xfrm>
-          <a:prstGeom prst="rect">
-            <a:avLst/>
-          </a:prstGeom>
-        </p:spPr>
-        <p:style>
-          <a:lnRef idx="2">
-            <a:schemeClr val="accent1">
-              <a:shade val="50000"/>
-            </a:schemeClr>
-          </a:lnRef>
-          <a:fillRef idx="1">
-            <a:schemeClr val="accent1"/>
-          </a:fillRef>
-          <a:effectRef idx="0">
-            <a:schemeClr val="accent1"/>
-          </a:effectRef>
-          <a:fontRef idx="minor">
-            <a:schemeClr val="lt1"/>
-          </a:fontRef>
-        </p:style>
-        <p:txBody>
-          <a:bodyPr rtlCol="0" anchor="ctr"/>
-          <a:lstStyle/>
-          <a:p>
-            <a:pPr algn="ctr"/>
-            <a:r>
-              <a:rPr lang="en-GB" sz="1600" dirty="0" err="1"/>
-              <a:t>org.apache.isis.extensions</a:t>
-            </a:r>
-            <a:br>
-              <a:rPr lang="en-GB" sz="1600" dirty="0"/>
-            </a:br>
-            <a:r>
-              <a:rPr lang="en-GB" sz="1600" dirty="0" err="1"/>
-              <a:t>isis</a:t>
-            </a:r>
-            <a:r>
-              <a:rPr lang="en-GB" sz="1600" dirty="0"/>
-              <a:t>-extensions</a:t>
-            </a:r>
-          </a:p>
-        </p:txBody>
-      </p:sp>
-      <p:sp>
-        <p:nvSpPr>
-          <p:cNvPr id="12" name="Rectangle 11">
-            <a:extLst>
-              <a:ext uri="{FF2B5EF4-FFF2-40B4-BE49-F238E27FC236}">
-                <a16:creationId xmlns:a16="http://schemas.microsoft.com/office/drawing/2014/main" id="{A0988CEC-6F8E-4A4D-B5D3-F61A05CDA768}"/>
-              </a:ext>
-            </a:extLst>
-          </p:cNvPr>
-          <p:cNvSpPr/>
-          <p:nvPr/>
-        </p:nvSpPr>
-        <p:spPr>
-          <a:xfrm>
-            <a:off x="6061707" y="2098787"/>
             <a:ext cx="2682817" cy="609606"/>
           </a:xfrm>
           <a:prstGeom prst="rect">
@@ -3962,7 +3902,7 @@
             <a:pPr algn="ctr"/>
             <a:r>
               <a:rPr lang="en-GB" sz="1600" dirty="0" err="1"/>
-              <a:t>org.apache.isis.app</a:t>
+              <a:t>org.apache.isis.extensions</a:t>
             </a:r>
             <a:br>
               <a:rPr lang="en-GB" sz="1600" dirty="0"/>
@@ -3973,17 +3913,17 @@
             </a:r>
             <a:r>
               <a:rPr lang="en-GB" sz="1600" dirty="0"/>
-              <a:t>-app-starter-parent</a:t>
-            </a:r>
-          </a:p>
-        </p:txBody>
-      </p:sp>
-      <p:sp>
-        <p:nvSpPr>
-          <p:cNvPr id="13" name="Rectangle 12">
-            <a:extLst>
-              <a:ext uri="{FF2B5EF4-FFF2-40B4-BE49-F238E27FC236}">
-                <a16:creationId xmlns:a16="http://schemas.microsoft.com/office/drawing/2014/main" id="{E2C3EFBF-23F4-4A0F-B36C-AEB12502FAF3}"/>
+              <a:t>-extensions</a:t>
+            </a:r>
+          </a:p>
+        </p:txBody>
+      </p:sp>
+      <p:sp>
+        <p:nvSpPr>
+          <p:cNvPr id="12" name="Rectangle 11">
+            <a:extLst>
+              <a:ext uri="{FF2B5EF4-FFF2-40B4-BE49-F238E27FC236}">
+                <a16:creationId xmlns:a16="http://schemas.microsoft.com/office/drawing/2014/main" id="{A0988CEC-6F8E-4A4D-B5D3-F61A05CDA768}"/>
               </a:ext>
             </a:extLst>
           </p:cNvPr>
@@ -3992,7 +3932,67 @@
         </p:nvSpPr>
         <p:spPr>
           <a:xfrm>
-            <a:off x="9170027" y="3289197"/>
+            <a:off x="6061707" y="2098787"/>
+            <a:ext cx="2682817" cy="609606"/>
+          </a:xfrm>
+          <a:prstGeom prst="rect">
+            <a:avLst/>
+          </a:prstGeom>
+        </p:spPr>
+        <p:style>
+          <a:lnRef idx="2">
+            <a:schemeClr val="accent6">
+              <a:shade val="50000"/>
+            </a:schemeClr>
+          </a:lnRef>
+          <a:fillRef idx="1">
+            <a:schemeClr val="accent6"/>
+          </a:fillRef>
+          <a:effectRef idx="0">
+            <a:schemeClr val="accent6"/>
+          </a:effectRef>
+          <a:fontRef idx="minor">
+            <a:schemeClr val="lt1"/>
+          </a:fontRef>
+        </p:style>
+        <p:txBody>
+          <a:bodyPr rtlCol="0" anchor="ctr"/>
+          <a:lstStyle/>
+          <a:p>
+            <a:pPr algn="ctr"/>
+            <a:r>
+              <a:rPr lang="en-GB" sz="1600" dirty="0" err="1"/>
+              <a:t>org.apache.isis.app</a:t>
+            </a:r>
+            <a:br>
+              <a:rPr lang="en-GB" sz="1600" dirty="0"/>
+            </a:br>
+            <a:r>
+              <a:rPr lang="en-GB" sz="1600" dirty="0" err="1"/>
+              <a:t>isis</a:t>
+            </a:r>
+            <a:r>
+              <a:rPr lang="en-GB" sz="1600" dirty="0"/>
+              <a:t>-app-starter-parent</a:t>
+            </a:r>
+          </a:p>
+        </p:txBody>
+      </p:sp>
+      <p:sp>
+        <p:nvSpPr>
+          <p:cNvPr id="13" name="Rectangle 12">
+            <a:extLst>
+              <a:ext uri="{FF2B5EF4-FFF2-40B4-BE49-F238E27FC236}">
+                <a16:creationId xmlns:a16="http://schemas.microsoft.com/office/drawing/2014/main" id="{E2C3EFBF-23F4-4A0F-B36C-AEB12502FAF3}"/>
+              </a:ext>
+            </a:extLst>
+          </p:cNvPr>
+          <p:cNvSpPr/>
+          <p:nvPr/>
+        </p:nvSpPr>
+        <p:spPr>
+          <a:xfrm>
+            <a:off x="8669702" y="3203416"/>
             <a:ext cx="2682817" cy="609606"/>
           </a:xfrm>
           <a:prstGeom prst="rect">
@@ -4363,8 +4363,8 @@
         </p:nvCxnSpPr>
         <p:spPr>
           <a:xfrm rot="16200000" flipV="1">
-            <a:off x="6415459" y="1311927"/>
-            <a:ext cx="456234" cy="5210239"/>
+            <a:off x="6669497" y="1057889"/>
+            <a:ext cx="456234" cy="5718315"/>
           </a:xfrm>
           <a:prstGeom prst="curvedConnector3">
             <a:avLst>
@@ -5014,8 +5014,8 @@
         </p:nvCxnSpPr>
         <p:spPr>
           <a:xfrm rot="5400000" flipH="1" flipV="1">
-            <a:off x="8130236" y="3997659"/>
-            <a:ext cx="361348" cy="1875570"/>
+            <a:off x="8384274" y="3743621"/>
+            <a:ext cx="361348" cy="2383646"/>
           </a:xfrm>
           <a:prstGeom prst="curvedConnector3">
             <a:avLst>
@@ -5058,9 +5058,9 @@
           <p:nvPr/>
         </p:nvCxnSpPr>
         <p:spPr>
-          <a:xfrm rot="16200000" flipV="1">
-            <a:off x="9070515" y="4932951"/>
-            <a:ext cx="361347" cy="4986"/>
+          <a:xfrm rot="5400000" flipH="1" flipV="1">
+            <a:off x="9324553" y="4683899"/>
+            <a:ext cx="361347" cy="503090"/>
           </a:xfrm>
           <a:prstGeom prst="curvedConnector3">
             <a:avLst>
@@ -5104,8 +5104,8 @@
         </p:nvCxnSpPr>
         <p:spPr>
           <a:xfrm rot="16200000" flipV="1">
-            <a:off x="9992764" y="4010702"/>
-            <a:ext cx="361347" cy="1849484"/>
+            <a:off x="10246802" y="4264740"/>
+            <a:ext cx="361347" cy="1341408"/>
           </a:xfrm>
           <a:prstGeom prst="curvedConnector3">
             <a:avLst>
@@ -5149,8 +5149,8 @@
         </p:nvCxnSpPr>
         <p:spPr>
           <a:xfrm rot="10800000">
-            <a:off x="7403117" y="2708394"/>
-            <a:ext cx="1766911" cy="885607"/>
+            <a:off x="7403116" y="2708393"/>
+            <a:ext cx="1266586" cy="799826"/>
           </a:xfrm>
           <a:prstGeom prst="curvedConnector2">
             <a:avLst/>
@@ -6141,6 +6141,56 @@
         <p:spPr>
           <a:xfrm>
             <a:off x="4945630" y="3010629"/>
+            <a:ext cx="2583807" cy="707886"/>
+          </a:xfrm>
+          <a:prstGeom prst="rect">
+            <a:avLst/>
+          </a:prstGeom>
+          <a:noFill/>
+        </p:spPr>
+        <p:txBody>
+          <a:bodyPr wrap="square" rtlCol="0">
+            <a:spAutoFit/>
+          </a:bodyPr>
+          <a:lstStyle/>
+          <a:p>
+            <a:pPr algn="ctr"/>
+            <a:r>
+              <a:rPr lang="en-GB" sz="1600" dirty="0"/>
+              <a:t>Convenience pom</a:t>
+            </a:r>
+            <a:br>
+              <a:rPr lang="en-GB" sz="1600" dirty="0"/>
+            </a:br>
+            <a:r>
+              <a:rPr lang="en-GB" sz="1200" i="1" dirty="0"/>
+              <a:t>scope=import,</a:t>
+            </a:r>
+            <a:br>
+              <a:rPr lang="en-GB" sz="1200" i="1" dirty="0"/>
+            </a:br>
+            <a:r>
+              <a:rPr lang="en-GB" sz="1200" i="1" dirty="0"/>
+              <a:t>type=pom</a:t>
+            </a:r>
+          </a:p>
+        </p:txBody>
+      </p:sp>
+      <p:sp>
+        <p:nvSpPr>
+          <p:cNvPr id="55" name="TextBox 54">
+            <a:extLst>
+              <a:ext uri="{FF2B5EF4-FFF2-40B4-BE49-F238E27FC236}">
+                <a16:creationId xmlns:a16="http://schemas.microsoft.com/office/drawing/2014/main" id="{EF97C55C-F1B7-49C7-856B-1CFCDFD3FBD8}"/>
+              </a:ext>
+            </a:extLst>
+          </p:cNvPr>
+          <p:cNvSpPr txBox="1"/>
+          <p:nvPr/>
+        </p:nvSpPr>
+        <p:spPr>
+          <a:xfrm>
+            <a:off x="5573144" y="4112289"/>
             <a:ext cx="2583807" cy="707886"/>
           </a:xfrm>
           <a:prstGeom prst="rect">

</xml_diff>

<commit_message>
ISIS-2206: moves isis-extensions/incubator to isis-incubator/incubator
</commit_message>
<xml_diff>
--- a/antora/components/core/modules/archdesign/attachments/pom-hierarchy.pptx
+++ b/antora/components/core/modules/archdesign/attachments/pom-hierarchy.pptx
@@ -261,7 +261,7 @@
           <a:p>
             <a:fld id="{F63ACD98-5124-4B8B-B052-6751B42D2BBE}" type="datetimeFigureOut">
               <a:rPr lang="en-GB" smtClean="0"/>
-              <a:t>20/11/2019</a:t>
+              <a:t>03/12/2019</a:t>
             </a:fld>
             <a:endParaRPr lang="en-GB"/>
           </a:p>
@@ -461,7 +461,7 @@
           <a:p>
             <a:fld id="{F63ACD98-5124-4B8B-B052-6751B42D2BBE}" type="datetimeFigureOut">
               <a:rPr lang="en-GB" smtClean="0"/>
-              <a:t>20/11/2019</a:t>
+              <a:t>03/12/2019</a:t>
             </a:fld>
             <a:endParaRPr lang="en-GB"/>
           </a:p>
@@ -671,7 +671,7 @@
           <a:p>
             <a:fld id="{F63ACD98-5124-4B8B-B052-6751B42D2BBE}" type="datetimeFigureOut">
               <a:rPr lang="en-GB" smtClean="0"/>
-              <a:t>20/11/2019</a:t>
+              <a:t>03/12/2019</a:t>
             </a:fld>
             <a:endParaRPr lang="en-GB"/>
           </a:p>
@@ -871,7 +871,7 @@
           <a:p>
             <a:fld id="{F63ACD98-5124-4B8B-B052-6751B42D2BBE}" type="datetimeFigureOut">
               <a:rPr lang="en-GB" smtClean="0"/>
-              <a:t>20/11/2019</a:t>
+              <a:t>03/12/2019</a:t>
             </a:fld>
             <a:endParaRPr lang="en-GB"/>
           </a:p>
@@ -1147,7 +1147,7 @@
           <a:p>
             <a:fld id="{F63ACD98-5124-4B8B-B052-6751B42D2BBE}" type="datetimeFigureOut">
               <a:rPr lang="en-GB" smtClean="0"/>
-              <a:t>20/11/2019</a:t>
+              <a:t>03/12/2019</a:t>
             </a:fld>
             <a:endParaRPr lang="en-GB"/>
           </a:p>
@@ -1415,7 +1415,7 @@
           <a:p>
             <a:fld id="{F63ACD98-5124-4B8B-B052-6751B42D2BBE}" type="datetimeFigureOut">
               <a:rPr lang="en-GB" smtClean="0"/>
-              <a:t>20/11/2019</a:t>
+              <a:t>03/12/2019</a:t>
             </a:fld>
             <a:endParaRPr lang="en-GB"/>
           </a:p>
@@ -1830,7 +1830,7 @@
           <a:p>
             <a:fld id="{F63ACD98-5124-4B8B-B052-6751B42D2BBE}" type="datetimeFigureOut">
               <a:rPr lang="en-GB" smtClean="0"/>
-              <a:t>20/11/2019</a:t>
+              <a:t>03/12/2019</a:t>
             </a:fld>
             <a:endParaRPr lang="en-GB"/>
           </a:p>
@@ -1972,7 +1972,7 @@
           <a:p>
             <a:fld id="{F63ACD98-5124-4B8B-B052-6751B42D2BBE}" type="datetimeFigureOut">
               <a:rPr lang="en-GB" smtClean="0"/>
-              <a:t>20/11/2019</a:t>
+              <a:t>03/12/2019</a:t>
             </a:fld>
             <a:endParaRPr lang="en-GB"/>
           </a:p>
@@ -2085,7 +2085,7 @@
           <a:p>
             <a:fld id="{F63ACD98-5124-4B8B-B052-6751B42D2BBE}" type="datetimeFigureOut">
               <a:rPr lang="en-GB" smtClean="0"/>
-              <a:t>20/11/2019</a:t>
+              <a:t>03/12/2019</a:t>
             </a:fld>
             <a:endParaRPr lang="en-GB"/>
           </a:p>
@@ -2398,7 +2398,7 @@
           <a:p>
             <a:fld id="{F63ACD98-5124-4B8B-B052-6751B42D2BBE}" type="datetimeFigureOut">
               <a:rPr lang="en-GB" smtClean="0"/>
-              <a:t>20/11/2019</a:t>
+              <a:t>03/12/2019</a:t>
             </a:fld>
             <a:endParaRPr lang="en-GB"/>
           </a:p>
@@ -2687,7 +2687,7 @@
           <a:p>
             <a:fld id="{F63ACD98-5124-4B8B-B052-6751B42D2BBE}" type="datetimeFigureOut">
               <a:rPr lang="en-GB" smtClean="0"/>
-              <a:t>20/11/2019</a:t>
+              <a:t>03/12/2019</a:t>
             </a:fld>
             <a:endParaRPr lang="en-GB"/>
           </a:p>
@@ -2930,7 +2930,7 @@
           <a:p>
             <a:fld id="{F63ACD98-5124-4B8B-B052-6751B42D2BBE}" type="datetimeFigureOut">
               <a:rPr lang="en-GB" smtClean="0"/>
-              <a:t>20/11/2019</a:t>
+              <a:t>03/12/2019</a:t>
             </a:fld>
             <a:endParaRPr lang="en-GB"/>
           </a:p>
@@ -4022,7 +4022,7 @@
             <a:pPr algn="ctr"/>
             <a:r>
               <a:rPr lang="en-GB" sz="1600" dirty="0" err="1"/>
-              <a:t>org.apache.isis.examples.apps</a:t>
+              <a:t>org.apache.isis.starters</a:t>
             </a:r>
             <a:br>
               <a:rPr lang="en-GB" sz="1600" dirty="0"/>
@@ -6140,8 +6140,8 @@
         </p:nvSpPr>
         <p:spPr>
           <a:xfrm>
-            <a:off x="4945630" y="3010629"/>
-            <a:ext cx="2583807" cy="707886"/>
+            <a:off x="6403908" y="4147463"/>
+            <a:ext cx="1762117" cy="707886"/>
           </a:xfrm>
           <a:prstGeom prst="rect">
             <a:avLst/>
@@ -6176,12 +6176,194 @@
           </a:p>
         </p:txBody>
       </p:sp>
-      <p:sp>
-        <p:nvSpPr>
-          <p:cNvPr id="55" name="TextBox 54">
-            <a:extLst>
-              <a:ext uri="{FF2B5EF4-FFF2-40B4-BE49-F238E27FC236}">
-                <a16:creationId xmlns:a16="http://schemas.microsoft.com/office/drawing/2014/main" id="{EF97C55C-F1B7-49C7-856B-1CFCDFD3FBD8}"/>
+      <p:cxnSp>
+        <p:nvCxnSpPr>
+          <p:cNvPr id="56" name="Connector: Curved 55">
+            <a:extLst>
+              <a:ext uri="{FF2B5EF4-FFF2-40B4-BE49-F238E27FC236}">
+                <a16:creationId xmlns:a16="http://schemas.microsoft.com/office/drawing/2014/main" id="{B652D14C-E757-4301-94F2-41ED0AED9778}"/>
+              </a:ext>
+            </a:extLst>
+          </p:cNvPr>
+          <p:cNvCxnSpPr>
+            <a:cxnSpLocks/>
+            <a:stCxn id="28" idx="4"/>
+            <a:endCxn id="9" idx="3"/>
+          </p:cNvCxnSpPr>
+          <p:nvPr/>
+        </p:nvCxnSpPr>
+        <p:spPr>
+          <a:xfrm rot="5400000">
+            <a:off x="5968081" y="2143168"/>
+            <a:ext cx="652742" cy="1829176"/>
+          </a:xfrm>
+          <a:prstGeom prst="curvedConnector2">
+            <a:avLst/>
+          </a:prstGeom>
+          <a:ln w="15875">
+            <a:prstDash val="sysDot"/>
+            <a:tailEnd type="triangle" w="lg" len="lg"/>
+          </a:ln>
+        </p:spPr>
+        <p:style>
+          <a:lnRef idx="1">
+            <a:schemeClr val="accent1"/>
+          </a:lnRef>
+          <a:fillRef idx="0">
+            <a:schemeClr val="accent1"/>
+          </a:fillRef>
+          <a:effectRef idx="0">
+            <a:schemeClr val="accent1"/>
+          </a:effectRef>
+          <a:fontRef idx="minor">
+            <a:schemeClr val="tx1"/>
+          </a:fontRef>
+        </p:style>
+      </p:cxnSp>
+      <p:cxnSp>
+        <p:nvCxnSpPr>
+          <p:cNvPr id="70" name="Connector: Curved 69">
+            <a:extLst>
+              <a:ext uri="{FF2B5EF4-FFF2-40B4-BE49-F238E27FC236}">
+                <a16:creationId xmlns:a16="http://schemas.microsoft.com/office/drawing/2014/main" id="{9B638456-867E-4F28-B036-959B376D0F3D}"/>
+              </a:ext>
+            </a:extLst>
+          </p:cNvPr>
+          <p:cNvCxnSpPr>
+            <a:cxnSpLocks/>
+            <a:stCxn id="28" idx="4"/>
+            <a:endCxn id="11" idx="3"/>
+          </p:cNvCxnSpPr>
+          <p:nvPr/>
+        </p:nvCxnSpPr>
+        <p:spPr>
+          <a:xfrm rot="5400000">
+            <a:off x="5758970" y="3005113"/>
+            <a:ext cx="1723799" cy="1176342"/>
+          </a:xfrm>
+          <a:prstGeom prst="curvedConnector2">
+            <a:avLst/>
+          </a:prstGeom>
+          <a:ln w="15875">
+            <a:prstDash val="sysDot"/>
+            <a:tailEnd type="triangle" w="lg" len="lg"/>
+          </a:ln>
+        </p:spPr>
+        <p:style>
+          <a:lnRef idx="1">
+            <a:schemeClr val="accent1"/>
+          </a:lnRef>
+          <a:fillRef idx="0">
+            <a:schemeClr val="accent1"/>
+          </a:fillRef>
+          <a:effectRef idx="0">
+            <a:schemeClr val="accent1"/>
+          </a:effectRef>
+          <a:fontRef idx="minor">
+            <a:schemeClr val="tx1"/>
+          </a:fontRef>
+        </p:style>
+      </p:cxnSp>
+      <p:sp>
+        <p:nvSpPr>
+          <p:cNvPr id="28" name="Oval 27">
+            <a:extLst>
+              <a:ext uri="{FF2B5EF4-FFF2-40B4-BE49-F238E27FC236}">
+                <a16:creationId xmlns:a16="http://schemas.microsoft.com/office/drawing/2014/main" id="{202F5073-62C6-46BF-9EDA-B246C99F02CC}"/>
+              </a:ext>
+            </a:extLst>
+          </p:cNvPr>
+          <p:cNvSpPr/>
+          <p:nvPr/>
+        </p:nvSpPr>
+        <p:spPr>
+          <a:xfrm>
+            <a:off x="7133347" y="2625169"/>
+            <a:ext cx="151385" cy="106216"/>
+          </a:xfrm>
+          <a:prstGeom prst="ellipse">
+            <a:avLst/>
+          </a:prstGeom>
+          <a:noFill/>
+          <a:ln>
+            <a:noFill/>
+          </a:ln>
+        </p:spPr>
+        <p:style>
+          <a:lnRef idx="2">
+            <a:schemeClr val="accent1">
+              <a:shade val="50000"/>
+            </a:schemeClr>
+          </a:lnRef>
+          <a:fillRef idx="1">
+            <a:schemeClr val="accent1"/>
+          </a:fillRef>
+          <a:effectRef idx="0">
+            <a:schemeClr val="accent1"/>
+          </a:effectRef>
+          <a:fontRef idx="minor">
+            <a:schemeClr val="lt1"/>
+          </a:fontRef>
+        </p:style>
+        <p:txBody>
+          <a:bodyPr rtlCol="0" anchor="ctr"/>
+          <a:lstStyle/>
+          <a:p>
+            <a:pPr algn="ctr"/>
+            <a:endParaRPr lang="en-GB"/>
+          </a:p>
+        </p:txBody>
+      </p:sp>
+      <p:cxnSp>
+        <p:nvCxnSpPr>
+          <p:cNvPr id="76" name="Connector: Curved 75">
+            <a:extLst>
+              <a:ext uri="{FF2B5EF4-FFF2-40B4-BE49-F238E27FC236}">
+                <a16:creationId xmlns:a16="http://schemas.microsoft.com/office/drawing/2014/main" id="{EE308E44-3575-4792-A147-87B73A2327AF}"/>
+              </a:ext>
+            </a:extLst>
+          </p:cNvPr>
+          <p:cNvCxnSpPr>
+            <a:cxnSpLocks/>
+          </p:cNvCxnSpPr>
+          <p:nvPr/>
+        </p:nvCxnSpPr>
+        <p:spPr>
+          <a:xfrm rot="16200000" flipH="1">
+            <a:off x="1621235" y="5366347"/>
+            <a:ext cx="401678" cy="204780"/>
+          </a:xfrm>
+          <a:prstGeom prst="curvedConnector3">
+            <a:avLst>
+              <a:gd name="adj1" fmla="val 50000"/>
+            </a:avLst>
+          </a:prstGeom>
+          <a:ln w="15875">
+            <a:prstDash val="sysDot"/>
+            <a:tailEnd type="triangle" w="lg" len="lg"/>
+          </a:ln>
+        </p:spPr>
+        <p:style>
+          <a:lnRef idx="1">
+            <a:schemeClr val="accent1"/>
+          </a:lnRef>
+          <a:fillRef idx="0">
+            <a:schemeClr val="accent1"/>
+          </a:fillRef>
+          <a:effectRef idx="0">
+            <a:schemeClr val="accent1"/>
+          </a:effectRef>
+          <a:fontRef idx="minor">
+            <a:schemeClr val="tx1"/>
+          </a:fontRef>
+        </p:style>
+      </p:cxnSp>
+      <p:sp>
+        <p:nvSpPr>
+          <p:cNvPr id="80" name="TextBox 79">
+            <a:extLst>
+              <a:ext uri="{FF2B5EF4-FFF2-40B4-BE49-F238E27FC236}">
+                <a16:creationId xmlns:a16="http://schemas.microsoft.com/office/drawing/2014/main" id="{AF73B36B-E5BD-4DB6-839F-417B7A7D14B2}"/>
               </a:ext>
             </a:extLst>
           </p:cNvPr>
@@ -6190,8 +6372,8 @@
         </p:nvSpPr>
         <p:spPr>
           <a:xfrm>
-            <a:off x="5573144" y="4112289"/>
-            <a:ext cx="2583807" cy="707886"/>
+            <a:off x="1916808" y="5322069"/>
+            <a:ext cx="767482" cy="307777"/>
           </a:xfrm>
           <a:prstGeom prst="rect">
             <a:avLst/>
@@ -6206,23 +6388,98 @@
           <a:p>
             <a:pPr algn="ctr"/>
             <a:r>
-              <a:rPr lang="en-GB" sz="1600" dirty="0"/>
-              <a:t>Convenience pom</a:t>
-            </a:r>
-            <a:br>
-              <a:rPr lang="en-GB" sz="1600" dirty="0"/>
-            </a:br>
-            <a:r>
-              <a:rPr lang="en-GB" sz="1200" i="1" dirty="0"/>
-              <a:t>scope=import,</a:t>
-            </a:r>
-            <a:br>
-              <a:rPr lang="en-GB" sz="1200" i="1" dirty="0"/>
-            </a:br>
-            <a:r>
-              <a:rPr lang="en-GB" sz="1200" i="1" dirty="0"/>
-              <a:t>type=pom</a:t>
-            </a:r>
+              <a:rPr lang="en-GB" sz="1400" i="1" dirty="0"/>
+              <a:t>import</a:t>
+            </a:r>
+          </a:p>
+        </p:txBody>
+      </p:sp>
+      <p:sp>
+        <p:nvSpPr>
+          <p:cNvPr id="72" name="TextBox 71">
+            <a:extLst>
+              <a:ext uri="{FF2B5EF4-FFF2-40B4-BE49-F238E27FC236}">
+                <a16:creationId xmlns:a16="http://schemas.microsoft.com/office/drawing/2014/main" id="{BDF52137-0747-4AB2-9273-85161B57606C}"/>
+              </a:ext>
+            </a:extLst>
+          </p:cNvPr>
+          <p:cNvSpPr txBox="1"/>
+          <p:nvPr/>
+        </p:nvSpPr>
+        <p:spPr>
+          <a:xfrm>
+            <a:off x="9597044" y="172344"/>
+            <a:ext cx="2583807" cy="830997"/>
+          </a:xfrm>
+          <a:prstGeom prst="rect">
+            <a:avLst/>
+          </a:prstGeom>
+          <a:noFill/>
+        </p:spPr>
+        <p:txBody>
+          <a:bodyPr wrap="square" rtlCol="0">
+            <a:spAutoFit/>
+          </a:bodyPr>
+          <a:lstStyle/>
+          <a:p>
+            <a:pPr algn="ctr"/>
+            <a:r>
+              <a:rPr lang="en-GB" sz="1200" dirty="0" err="1">
+                <a:solidFill>
+                  <a:schemeClr val="accent1">
+                    <a:lumMod val="75000"/>
+                  </a:schemeClr>
+                </a:solidFill>
+              </a:rPr>
+              <a:t>org.apache.isis.incubator</a:t>
+            </a:r>
+            <a:r>
+              <a:rPr lang="en-GB" sz="1200" dirty="0">
+                <a:solidFill>
+                  <a:schemeClr val="accent1">
+                    <a:lumMod val="75000"/>
+                  </a:schemeClr>
+                </a:solidFill>
+              </a:rPr>
+              <a:t> and </a:t>
+            </a:r>
+            <a:r>
+              <a:rPr lang="en-GB" sz="1200" dirty="0" err="1">
+                <a:solidFill>
+                  <a:schemeClr val="accent1">
+                    <a:lumMod val="75000"/>
+                  </a:schemeClr>
+                </a:solidFill>
+              </a:rPr>
+              <a:t>org.apache.isis.legacy</a:t>
+            </a:r>
+            <a:r>
+              <a:rPr lang="en-GB" sz="1200" dirty="0">
+                <a:solidFill>
+                  <a:schemeClr val="accent1">
+                    <a:lumMod val="75000"/>
+                  </a:schemeClr>
+                </a:solidFill>
+              </a:rPr>
+              <a:t> are not shown, but are both structured exactly the same as </a:t>
+            </a:r>
+            <a:r>
+              <a:rPr lang="en-GB" sz="1200" dirty="0" err="1">
+                <a:solidFill>
+                  <a:schemeClr val="accent1">
+                    <a:lumMod val="75000"/>
+                  </a:schemeClr>
+                </a:solidFill>
+              </a:rPr>
+              <a:t>org.apache.isis.extensions</a:t>
+            </a:r>
+            <a:endParaRPr lang="en-GB" sz="1050" dirty="0">
+              <a:solidFill>
+                <a:schemeClr val="accent1">
+                  <a:lumMod val="75000"/>
+                </a:schemeClr>
+              </a:solidFill>
+            </a:endParaRPr>
           </a:p>
         </p:txBody>
       </p:sp>

</xml_diff>